<commit_message>
TPAC2019 breakout Introduction slides
</commit_message>
<xml_diff>
--- a/AHA-CG-Proposal.pptx
+++ b/AHA-CG-Proposal.pptx
@@ -203,7 +203,7 @@
           <a:p>
             <a:fld id="{5E27BD9A-B41E-4B9B-8B35-36FC47692660}" type="datetimeFigureOut">
               <a:rPr kumimoji="1" lang="ja-JP" altLang="en-US" smtClean="0"/>
-              <a:t>2019/9/17</a:t>
+              <a:t>2019/9/18</a:t>
             </a:fld>
             <a:endParaRPr kumimoji="1" lang="ja-JP" altLang="en-US"/>
           </a:p>
@@ -3793,14 +3793,16 @@
         </p:nvSpPr>
         <p:spPr/>
         <p:txBody>
-          <a:bodyPr/>
+          <a:bodyPr>
+            <a:normAutofit/>
+          </a:bodyPr>
           <a:lstStyle/>
           <a:p>
             <a:r>
               <a:rPr kumimoji="1" lang="en-US" altLang="ja-JP" dirty="0" smtClean="0"/>
               <a:t>Anti-Homograph-Attacks</a:t>
             </a:r>
-            <a:endParaRPr kumimoji="1" lang="ja-JP" altLang="en-US" dirty="0"/>
+            <a:endParaRPr kumimoji="1" lang="ja-JP" altLang="en-US" sz="4400" dirty="0"/>
           </a:p>
         </p:txBody>
       </p:sp>
@@ -3814,23 +3816,65 @@
             <p:ph type="subTitle" idx="1"/>
           </p:nvPr>
         </p:nvSpPr>
-        <p:spPr/>
-        <p:txBody>
-          <a:bodyPr/>
-          <a:lstStyle/>
-          <a:p>
-            <a:endParaRPr kumimoji="1" lang="en-US" altLang="ja-JP" dirty="0" smtClean="0"/>
+        <p:spPr>
+          <a:xfrm>
+            <a:off x="1524000" y="3602037"/>
+            <a:ext cx="9144000" cy="2122357"/>
+          </a:xfrm>
+        </p:spPr>
+        <p:txBody>
+          <a:bodyPr>
+            <a:normAutofit/>
+          </a:bodyPr>
+          <a:lstStyle/>
+          <a:p>
+            <a:endParaRPr lang="en-US" altLang="ja-JP" dirty="0" smtClean="0"/>
           </a:p>
           <a:p>
             <a:r>
               <a:rPr lang="en-US" altLang="ja-JP" dirty="0" smtClean="0"/>
-              <a:t>18 Sep 2019</a:t>
+              <a:t>18 </a:t>
+            </a:r>
+            <a:r>
+              <a:rPr lang="en-US" altLang="ja-JP" dirty="0" smtClean="0"/>
+              <a:t>Sep 2019</a:t>
             </a:r>
           </a:p>
           <a:p>
             <a:r>
               <a:rPr kumimoji="1" lang="en-US" altLang="ja-JP" dirty="0" smtClean="0"/>
               <a:t>TPAC2019</a:t>
+            </a:r>
+          </a:p>
+          <a:p>
+            <a:r>
+              <a:rPr lang="en-US" altLang="ja-JP" dirty="0">
+                <a:hlinkClick r:id="rId3"/>
+              </a:rPr>
+              <a:t>https://github.com/yoneyajp/AHA/wiki</a:t>
+            </a:r>
+            <a:r>
+              <a:rPr lang="en-US" altLang="ja-JP" dirty="0"/>
+              <a:t/>
+            </a:r>
+            <a:br>
+              <a:rPr lang="en-US" altLang="ja-JP" dirty="0"/>
+            </a:br>
+            <a:r>
+              <a:rPr lang="en-US" altLang="ja-JP" dirty="0"/>
+              <a:t>IRC:</a:t>
+            </a:r>
+            <a:r>
+              <a:rPr lang="ja-JP" altLang="en-US" dirty="0"/>
+              <a:t> </a:t>
+            </a:r>
+            <a:r>
+              <a:rPr lang="en-US" altLang="ja-JP" dirty="0"/>
+              <a:t>#</a:t>
+            </a:r>
+            <a:r>
+              <a:rPr lang="en-US" altLang="ja-JP" dirty="0" smtClean="0"/>
+              <a:t>aha</a:t>
             </a:r>
             <a:endParaRPr kumimoji="1" lang="ja-JP" altLang="en-US" dirty="0"/>
           </a:p>
@@ -5042,11 +5086,7 @@
           <a:p>
             <a:r>
               <a:rPr lang="en-US" altLang="ja-JP" dirty="0" smtClean="0"/>
-              <a:t>We will form CG if we found 5 or more interests</a:t>
-            </a:r>
-            <a:r>
-              <a:rPr lang="en-US" altLang="ja-JP" dirty="0" smtClean="0"/>
-              <a:t>.</a:t>
+              <a:t>We will form CG if we found 5 or more interests.</a:t>
             </a:r>
           </a:p>
           <a:p>

</xml_diff>